<commit_message>
changed / corrected images
</commit_message>
<xml_diff>
--- a/images/graphical_abstract.pptx
+++ b/images/graphical_abstract.pptx
@@ -3025,12 +3025,12 @@
         </p:nvCxnSpPr>
         <p:spPr>
           <a:xfrm rot="16200000" flipV="1">
-            <a:off x="5807680" y="-267622"/>
-            <a:ext cx="65776" cy="8936680"/>
+            <a:off x="5818311" y="-256996"/>
+            <a:ext cx="44521" cy="8936685"/>
           </a:xfrm>
           <a:prstGeom prst="bentConnector3">
             <a:avLst>
-              <a:gd name="adj1" fmla="val 569183"/>
+              <a:gd name="adj1" fmla="val 821161"/>
             </a:avLst>
           </a:prstGeom>
           <a:ln w="69850" cap="rnd">
@@ -6430,13 +6430,6 @@
                 </a:rPr>
                 <a:t>Activation function parameter perturbation</a:t>
               </a:r>
-              <a:endParaRPr lang="en-US" sz="1400" dirty="0">
-                <a:solidFill>
-                  <a:schemeClr val="bg2">
-                    <a:lumMod val="90000"/>
-                  </a:schemeClr>
-                </a:solidFill>
-              </a:endParaRPr>
             </a:p>
           </p:txBody>
         </p:sp>
@@ -6473,13 +6466,6 @@
                 </a:rPr>
                 <a:t>Simulate environmental influences on single neurons or the whole system at once</a:t>
               </a:r>
-              <a:endParaRPr lang="en-US" sz="1400" dirty="0">
-                <a:solidFill>
-                  <a:schemeClr val="bg2">
-                    <a:lumMod val="90000"/>
-                  </a:schemeClr>
-                </a:solidFill>
-              </a:endParaRPr>
             </a:p>
           </p:txBody>
         </p:sp>
@@ -6531,8 +6517,8 @@
         </p:nvGrpSpPr>
         <p:grpSpPr>
           <a:xfrm>
-            <a:off x="-612425" y="4167830"/>
-            <a:ext cx="3969305" cy="3536334"/>
+            <a:off x="-612425" y="4189086"/>
+            <a:ext cx="3969305" cy="3679935"/>
             <a:chOff x="114760" y="1739158"/>
             <a:chExt cx="3244790" cy="3076516"/>
           </a:xfrm>
@@ -8669,20 +8655,6 @@
                 </a:rPr>
                 <a:t>?</a:t>
               </a:r>
-              <a:endParaRPr lang="en-US" sz="4000" b="1" dirty="0">
-                <a:ln w="22225">
-                  <a:solidFill>
-                    <a:schemeClr val="accent2"/>
-                  </a:solidFill>
-                  <a:prstDash val="solid"/>
-                </a:ln>
-                <a:solidFill>
-                  <a:schemeClr val="accent2">
-                    <a:lumMod val="40000"/>
-                    <a:lumOff val="60000"/>
-                  </a:schemeClr>
-                </a:solidFill>
-              </a:endParaRPr>
             </a:p>
           </p:txBody>
         </p:sp>
@@ -8722,17 +8694,6 @@
                 </a:rPr>
                 <a:t>?</a:t>
               </a:r>
-              <a:endParaRPr lang="en-US" sz="4000" b="1" dirty="0">
-                <a:ln w="22225">
-                  <a:solidFill>
-                    <a:schemeClr val="accent2"/>
-                  </a:solidFill>
-                  <a:prstDash val="solid"/>
-                </a:ln>
-                <a:solidFill>
-                  <a:srgbClr val="FF0000"/>
-                </a:solidFill>
-              </a:endParaRPr>
             </a:p>
           </p:txBody>
         </p:sp>
@@ -8772,17 +8733,6 @@
                 </a:rPr>
                 <a:t>?</a:t>
               </a:r>
-              <a:endParaRPr lang="en-US" sz="4000" b="1" dirty="0">
-                <a:ln w="22225">
-                  <a:solidFill>
-                    <a:schemeClr val="accent2"/>
-                  </a:solidFill>
-                  <a:prstDash val="solid"/>
-                </a:ln>
-                <a:solidFill>
-                  <a:srgbClr val="FF0000"/>
-                </a:solidFill>
-              </a:endParaRPr>
             </a:p>
           </p:txBody>
         </p:sp>
@@ -8822,17 +8772,6 @@
                 </a:rPr>
                 <a:t>?</a:t>
               </a:r>
-              <a:endParaRPr lang="en-US" sz="4000" b="1" dirty="0">
-                <a:ln w="22225">
-                  <a:solidFill>
-                    <a:schemeClr val="accent2"/>
-                  </a:solidFill>
-                  <a:prstDash val="solid"/>
-                </a:ln>
-                <a:solidFill>
-                  <a:srgbClr val="FF0000"/>
-                </a:solidFill>
-              </a:endParaRPr>
             </a:p>
           </p:txBody>
         </p:sp>
@@ -8851,9 +8790,7 @@
             <a:chExt cx="4956497" cy="4653099"/>
           </a:xfrm>
           <a:scene3d>
-            <a:camera prst="perspectiveContrastingLeftFacing">
-              <a:rot lat="623785" lon="2636332" rev="21360000"/>
-            </a:camera>
+            <a:camera prst="perspectiveContrastingLeftFacing"/>
             <a:lightRig rig="threePt" dir="t"/>
           </a:scene3d>
         </p:grpSpPr>
@@ -8909,8 +8846,8 @@
             </p:nvSpPr>
             <p:spPr>
               <a:xfrm>
-                <a:off x="3713826" y="-2833115"/>
-                <a:ext cx="1233830" cy="801989"/>
+                <a:off x="3713824" y="-2833115"/>
+                <a:ext cx="1250337" cy="801989"/>
               </a:xfrm>
               <a:custGeom>
                 <a:avLst/>
@@ -9057,7 +8994,6 @@
                   <a:rPr lang="en-US" sz="2200" dirty="0"/>
                   <a:t>CROSS</a:t>
                 </a:r>
-                <a:endParaRPr lang="en-US" sz="2200" dirty="0"/>
               </a:p>
             </p:txBody>
           </p:sp>
@@ -9281,7 +9217,6 @@
                   <a:rPr lang="en-US" sz="2200" dirty="0"/>
                   <a:t>EVAL</a:t>
                 </a:r>
-                <a:endParaRPr lang="en-US" sz="2200" dirty="0"/>
               </a:p>
             </p:txBody>
           </p:sp>
@@ -9505,7 +9440,6 @@
                   <a:rPr lang="en-US" sz="2200" dirty="0"/>
                   <a:t>EXIT?</a:t>
                 </a:r>
-                <a:endParaRPr lang="en-US" sz="2200" dirty="0"/>
               </a:p>
             </p:txBody>
           </p:sp>
@@ -9729,7 +9663,6 @@
                   <a:rPr lang="en-US" sz="2200" dirty="0"/>
                   <a:t>SELECT</a:t>
                 </a:r>
-                <a:endParaRPr lang="en-US" sz="2200" dirty="0"/>
               </a:p>
             </p:txBody>
           </p:sp>
@@ -9802,8 +9735,8 @@
             </p:nvSpPr>
             <p:spPr>
               <a:xfrm>
-                <a:off x="2028615" y="-1737469"/>
-                <a:ext cx="1322603" cy="801989"/>
+                <a:off x="1977620" y="-1737470"/>
+                <a:ext cx="1412081" cy="801989"/>
               </a:xfrm>
               <a:custGeom>
                 <a:avLst/>
@@ -9953,7 +9886,6 @@
                   <a:rPr lang="en-US" sz="2000" dirty="0"/>
                   <a:t>MUTATE</a:t>
                 </a:r>
-                <a:endParaRPr lang="en-US" sz="2000" dirty="0"/>
               </a:p>
             </p:txBody>
           </p:sp>
@@ -10085,11 +10017,6 @@
                 </a:rPr>
                 <a:t>INIT</a:t>
               </a:r>
-              <a:endParaRPr lang="en-US" sz="2400" b="1" dirty="0">
-                <a:solidFill>
-                  <a:schemeClr val="bg2"/>
-                </a:solidFill>
-              </a:endParaRPr>
             </a:p>
           </p:txBody>
         </p:sp>
@@ -13673,13 +13600,6 @@
                 </a:rPr>
                 <a:t>Activation function parameter perturbation</a:t>
               </a:r>
-              <a:endParaRPr lang="en-US" sz="1400" dirty="0">
-                <a:solidFill>
-                  <a:schemeClr val="bg2">
-                    <a:lumMod val="90000"/>
-                  </a:schemeClr>
-                </a:solidFill>
-              </a:endParaRPr>
             </a:p>
           </p:txBody>
         </p:sp>
@@ -13716,13 +13636,6 @@
                 </a:rPr>
                 <a:t>Simulate environmental influences on single neurons or the whole system at once</a:t>
               </a:r>
-              <a:endParaRPr lang="en-US" sz="1400" dirty="0">
-                <a:solidFill>
-                  <a:schemeClr val="bg2">
-                    <a:lumMod val="90000"/>
-                  </a:schemeClr>
-                </a:solidFill>
-              </a:endParaRPr>
             </a:p>
           </p:txBody>
         </p:sp>
@@ -15900,20 +15813,6 @@
                 </a:rPr>
                 <a:t>?</a:t>
               </a:r>
-              <a:endParaRPr lang="en-US" sz="4000" b="1" dirty="0">
-                <a:ln w="22225">
-                  <a:solidFill>
-                    <a:schemeClr val="accent2"/>
-                  </a:solidFill>
-                  <a:prstDash val="solid"/>
-                </a:ln>
-                <a:solidFill>
-                  <a:schemeClr val="accent2">
-                    <a:lumMod val="40000"/>
-                    <a:lumOff val="60000"/>
-                  </a:schemeClr>
-                </a:solidFill>
-              </a:endParaRPr>
             </a:p>
           </p:txBody>
         </p:sp>
@@ -15953,17 +15852,6 @@
                 </a:rPr>
                 <a:t>?</a:t>
               </a:r>
-              <a:endParaRPr lang="en-US" sz="4000" b="1" dirty="0">
-                <a:ln w="22225">
-                  <a:solidFill>
-                    <a:schemeClr val="accent2"/>
-                  </a:solidFill>
-                  <a:prstDash val="solid"/>
-                </a:ln>
-                <a:solidFill>
-                  <a:srgbClr val="FF0000"/>
-                </a:solidFill>
-              </a:endParaRPr>
             </a:p>
           </p:txBody>
         </p:sp>
@@ -16003,17 +15891,6 @@
                 </a:rPr>
                 <a:t>?</a:t>
               </a:r>
-              <a:endParaRPr lang="en-US" sz="4000" b="1" dirty="0">
-                <a:ln w="22225">
-                  <a:solidFill>
-                    <a:schemeClr val="accent2"/>
-                  </a:solidFill>
-                  <a:prstDash val="solid"/>
-                </a:ln>
-                <a:solidFill>
-                  <a:srgbClr val="FF0000"/>
-                </a:solidFill>
-              </a:endParaRPr>
             </a:p>
           </p:txBody>
         </p:sp>
@@ -16053,17 +15930,6 @@
                 </a:rPr>
                 <a:t>?</a:t>
               </a:r>
-              <a:endParaRPr lang="en-US" sz="4000" b="1" dirty="0">
-                <a:ln w="22225">
-                  <a:solidFill>
-                    <a:schemeClr val="accent2"/>
-                  </a:solidFill>
-                  <a:prstDash val="solid"/>
-                </a:ln>
-                <a:solidFill>
-                  <a:srgbClr val="FF0000"/>
-                </a:solidFill>
-              </a:endParaRPr>
             </a:p>
           </p:txBody>
         </p:sp>
@@ -16282,7 +16148,6 @@
                   <a:rPr lang="en-US" sz="2200" dirty="0"/>
                   <a:t>CROSS</a:t>
                 </a:r>
-                <a:endParaRPr lang="en-US" sz="2200" dirty="0"/>
               </a:p>
             </p:txBody>
           </p:sp>
@@ -16506,7 +16371,6 @@
                   <a:rPr lang="en-US" sz="2200" dirty="0"/>
                   <a:t>EVAL</a:t>
                 </a:r>
-                <a:endParaRPr lang="en-US" sz="2200" dirty="0"/>
               </a:p>
             </p:txBody>
           </p:sp>
@@ -16730,7 +16594,6 @@
                   <a:rPr lang="en-US" sz="2200" dirty="0"/>
                   <a:t>EXIT?</a:t>
                 </a:r>
-                <a:endParaRPr lang="en-US" sz="2200" dirty="0"/>
               </a:p>
             </p:txBody>
           </p:sp>
@@ -16954,7 +16817,6 @@
                   <a:rPr lang="en-US" sz="2200" dirty="0"/>
                   <a:t>SELECT</a:t>
                 </a:r>
-                <a:endParaRPr lang="en-US" sz="2200" dirty="0"/>
               </a:p>
             </p:txBody>
           </p:sp>
@@ -17027,8 +16889,8 @@
             </p:nvSpPr>
             <p:spPr>
               <a:xfrm>
-                <a:off x="2028615" y="-1737469"/>
-                <a:ext cx="1322603" cy="801989"/>
+                <a:off x="1974168" y="-1737469"/>
+                <a:ext cx="1441109" cy="801989"/>
               </a:xfrm>
               <a:custGeom>
                 <a:avLst/>
@@ -17178,7 +17040,6 @@
                   <a:rPr lang="en-US" sz="2000" dirty="0"/>
                   <a:t>MUTATE</a:t>
                 </a:r>
-                <a:endParaRPr lang="en-US" sz="2000" dirty="0"/>
               </a:p>
             </p:txBody>
           </p:sp>
@@ -17310,11 +17171,6 @@
                 </a:rPr>
                 <a:t>INIT</a:t>
               </a:r>
-              <a:endParaRPr lang="en-US" sz="2400" b="1" dirty="0">
-                <a:solidFill>
-                  <a:schemeClr val="bg2"/>
-                </a:solidFill>
-              </a:endParaRPr>
             </a:p>
           </p:txBody>
         </p:sp>
@@ -17340,8 +17196,8 @@
           </p:blipFill>
           <p:spPr>
             <a:xfrm>
-              <a:off x="3571912" y="-1770986"/>
-              <a:ext cx="1756418" cy="1578012"/>
+              <a:off x="3609800" y="-1747189"/>
+              <a:ext cx="1756419" cy="1578012"/>
             </a:xfrm>
             <a:prstGeom prst="rect">
               <a:avLst/>

</xml_diff>